<commit_message>
Arquivos para construção da apresentação
</commit_message>
<xml_diff>
--- a/ALVF_AnalisePropostas_TI_DiretoriaExecutiva_Fev_2025/Apresentação_ProspecçãoSistema_Core_ALVF.pptx
+++ b/ALVF_AnalisePropostas_TI_DiretoriaExecutiva_Fev_2025/Apresentação_ProspecçãoSistema_Core_ALVF.pptx
@@ -5,7 +5,7 @@
     <p:sldMasterId id="2147483744" r:id="rId1"/>
   </p:sldMasterIdLst>
   <p:notesMasterIdLst>
-    <p:notesMasterId r:id="rId53"/>
+    <p:notesMasterId r:id="rId52"/>
   </p:notesMasterIdLst>
   <p:sldIdLst>
     <p:sldId id="256" r:id="rId2"/>
@@ -56,9 +56,8 @@
     <p:sldId id="408" r:id="rId47"/>
     <p:sldId id="409" r:id="rId48"/>
     <p:sldId id="400" r:id="rId49"/>
-    <p:sldId id="403" r:id="rId50"/>
-    <p:sldId id="404" r:id="rId51"/>
-    <p:sldId id="262" r:id="rId52"/>
+    <p:sldId id="404" r:id="rId50"/>
+    <p:sldId id="262" r:id="rId51"/>
   </p:sldIdLst>
   <p:sldSz cx="9144000" cy="6858000" type="screen4x3"/>
   <p:notesSz cx="6858000" cy="9144000"/>
@@ -4830,133 +4829,6 @@
   <p:cSld>
     <p:spTree>
       <p:nvGrpSpPr>
-        <p:cNvPr id="1" name="Shape 103">
-          <a:extLst>
-            <a:ext uri="{FF2B5EF4-FFF2-40B4-BE49-F238E27FC236}">
-              <a16:creationId xmlns:a16="http://schemas.microsoft.com/office/drawing/2014/main" id="{A8AFEB93-5F9D-3ADE-0828-BE90FE02FB72}"/>
-            </a:ext>
-          </a:extLst>
-        </p:cNvPr>
-        <p:cNvGrpSpPr/>
-        <p:nvPr/>
-      </p:nvGrpSpPr>
-      <p:grpSpPr>
-        <a:xfrm>
-          <a:off x="0" y="0"/>
-          <a:ext cx="0" cy="0"/>
-          <a:chOff x="0" y="0"/>
-          <a:chExt cx="0" cy="0"/>
-        </a:xfrm>
-      </p:grpSpPr>
-      <p:sp>
-        <p:nvSpPr>
-          <p:cNvPr id="104" name="Google Shape;104;g2d3d2ac0264_0_197:notes">
-            <a:extLst>
-              <a:ext uri="{FF2B5EF4-FFF2-40B4-BE49-F238E27FC236}">
-                <a16:creationId xmlns:a16="http://schemas.microsoft.com/office/drawing/2014/main" id="{3EDEB8B4-06C4-5EE8-050C-A2E5AE5157A4}"/>
-              </a:ext>
-            </a:extLst>
-          </p:cNvPr>
-          <p:cNvSpPr>
-            <a:spLocks noGrp="1" noRot="1" noChangeAspect="1"/>
-          </p:cNvSpPr>
-          <p:nvPr>
-            <p:ph type="sldImg" idx="2"/>
-          </p:nvPr>
-        </p:nvSpPr>
-        <p:spPr>
-          <a:xfrm>
-            <a:off x="1143000" y="685800"/>
-            <a:ext cx="4572000" cy="3429000"/>
-          </a:xfrm>
-          <a:custGeom>
-            <a:avLst/>
-            <a:gdLst/>
-            <a:ahLst/>
-            <a:cxnLst/>
-            <a:rect l="l" t="t" r="r" b="b"/>
-            <a:pathLst>
-              <a:path w="120000" h="120000" extrusionOk="0">
-                <a:moveTo>
-                  <a:pt x="0" y="0"/>
-                </a:moveTo>
-                <a:lnTo>
-                  <a:pt x="120000" y="0"/>
-                </a:lnTo>
-                <a:lnTo>
-                  <a:pt x="120000" y="120000"/>
-                </a:lnTo>
-                <a:lnTo>
-                  <a:pt x="0" y="120000"/>
-                </a:lnTo>
-                <a:close/>
-              </a:path>
-            </a:pathLst>
-          </a:custGeom>
-        </p:spPr>
-      </p:sp>
-      <p:sp>
-        <p:nvSpPr>
-          <p:cNvPr id="105" name="Google Shape;105;g2d3d2ac0264_0_197:notes">
-            <a:extLst>
-              <a:ext uri="{FF2B5EF4-FFF2-40B4-BE49-F238E27FC236}">
-                <a16:creationId xmlns:a16="http://schemas.microsoft.com/office/drawing/2014/main" id="{87055EA3-013C-DD5A-39FE-5B9CA7435958}"/>
-              </a:ext>
-            </a:extLst>
-          </p:cNvPr>
-          <p:cNvSpPr txBox="1">
-            <a:spLocks noGrp="1"/>
-          </p:cNvSpPr>
-          <p:nvPr>
-            <p:ph type="body" idx="1"/>
-          </p:nvPr>
-        </p:nvSpPr>
-        <p:spPr>
-          <a:xfrm>
-            <a:off x="685800" y="4343400"/>
-            <a:ext cx="5486400" cy="4114800"/>
-          </a:xfrm>
-          <a:prstGeom prst="rect">
-            <a:avLst/>
-          </a:prstGeom>
-        </p:spPr>
-        <p:txBody>
-          <a:bodyPr spcFirstLastPara="1" wrap="square" lIns="91425" tIns="91425" rIns="91425" bIns="91425" anchor="t" anchorCtr="0">
-            <a:noAutofit/>
-          </a:bodyPr>
-          <a:lstStyle/>
-          <a:p>
-            <a:pPr marL="0" lvl="0" indent="0" algn="l" rtl="0">
-              <a:spcBef>
-                <a:spcPts val="0"/>
-              </a:spcBef>
-              <a:spcAft>
-                <a:spcPts val="0"/>
-              </a:spcAft>
-              <a:buNone/>
-            </a:pPr>
-            <a:endParaRPr/>
-          </a:p>
-        </p:txBody>
-      </p:sp>
-    </p:spTree>
-    <p:extLst>
-      <p:ext uri="{BB962C8B-B14F-4D97-AF65-F5344CB8AC3E}">
-        <p14:creationId xmlns:p14="http://schemas.microsoft.com/office/powerpoint/2010/main" val="1910628983"/>
-      </p:ext>
-    </p:extLst>
-  </p:cSld>
-  <p:clrMapOvr>
-    <a:masterClrMapping/>
-  </p:clrMapOvr>
-</p:notes>
-</file>
-
-<file path=ppt/notesSlides/notesSlide21.xml><?xml version="1.0" encoding="utf-8"?>
-<p:notes xmlns:a="http://schemas.openxmlformats.org/drawingml/2006/main" xmlns:r="http://schemas.openxmlformats.org/officeDocument/2006/relationships" xmlns:p="http://schemas.openxmlformats.org/presentationml/2006/main" showMasterSp="0" showMasterPhAnim="0">
-  <p:cSld>
-    <p:spTree>
-      <p:nvGrpSpPr>
         <p:cNvPr id="1" name="Shape 74"/>
         <p:cNvGrpSpPr/>
         <p:nvPr/>
@@ -21569,7 +21441,7 @@
           <a:lstStyle/>
           <a:p>
             <a:r>
-              <a:rPr lang="pt-BR" dirty="0"/>
+              <a:rPr lang="pt-BR" b="1" dirty="0"/>
               <a:t>API</a:t>
             </a:r>
           </a:p>
@@ -21603,13 +21475,15 @@
           </a:bodyPr>
           <a:lstStyle/>
           <a:p>
-            <a:pPr algn="just"/>
+            <a:pPr marL="0" indent="0" algn="just">
+              <a:buNone/>
+            </a:pPr>
             <a:r>
               <a:rPr lang="pt-BR" sz="2800" dirty="0">
                 <a:latin typeface="Arial" panose="020B0604020202020204" pitchFamily="34" charset="0"/>
                 <a:cs typeface="Arial" panose="020B0604020202020204" pitchFamily="34" charset="0"/>
               </a:rPr>
-              <a:t>Uma </a:t>
+              <a:t> A </a:t>
             </a:r>
             <a:r>
               <a:rPr lang="pt-BR" sz="2800" b="1" dirty="0"/>
@@ -21640,47 +21514,64 @@
                 <a:latin typeface="Arial" panose="020B0604020202020204" pitchFamily="34" charset="0"/>
                 <a:cs typeface="Arial" panose="020B0604020202020204" pitchFamily="34" charset="0"/>
               </a:rPr>
-              <a:t>é um conjunto de regras e protocolos que permite que diferentes sistemas se comuniquem entre si. No contexto hospitalar, as APIs possibilitam a integração entre:</a:t>
-            </a:r>
-          </a:p>
-          <a:p>
-            <a:pPr algn="just"/>
-            <a:r>
-              <a:rPr lang="pt-BR" sz="2800" b="1" dirty="0"/>
+              <a:t>contempla um conjunto de regras e protocolos para que diferentes sistemas se comuniquem entre si. É o que possibilita a integração entre:</a:t>
+            </a:r>
+          </a:p>
+          <a:p>
+            <a:pPr marL="0" indent="0" algn="just">
+              <a:buNone/>
+            </a:pPr>
+            <a:endParaRPr lang="pt-BR" sz="2800" dirty="0">
+              <a:latin typeface="Arial" panose="020B0604020202020204" pitchFamily="34" charset="0"/>
+              <a:cs typeface="Arial" panose="020B0604020202020204" pitchFamily="34" charset="0"/>
+            </a:endParaRPr>
+          </a:p>
+          <a:p>
+            <a:pPr lvl="1" algn="just"/>
+            <a:r>
+              <a:rPr lang="pt-BR" sz="2500" b="1" dirty="0"/>
               <a:t>Sistema Core Hospitalar</a:t>
             </a:r>
             <a:r>
-              <a:rPr lang="pt-BR" sz="2800" dirty="0"/>
+              <a:rPr lang="pt-BR" sz="2500" dirty="0"/>
               <a:t> </a:t>
             </a:r>
-            <a:r>
-              <a:rPr lang="pt-BR" sz="2800" dirty="0">
-                <a:latin typeface="Arial" panose="020B0604020202020204" pitchFamily="34" charset="0"/>
-                <a:cs typeface="Arial" panose="020B0604020202020204" pitchFamily="34" charset="0"/>
-              </a:rPr>
-              <a:t>– responsável pelo gerenciamento de prontuários eletrônicos, atendimento, leitos e procedimentos médicos.</a:t>
-            </a:r>
-          </a:p>
-          <a:p>
-            <a:pPr algn="just"/>
-            <a:r>
-              <a:rPr lang="pt-BR" sz="2800" b="1" dirty="0"/>
+          </a:p>
+          <a:p>
+            <a:pPr lvl="1" algn="just"/>
+            <a:r>
+              <a:rPr lang="pt-BR" sz="2500" b="1" dirty="0"/>
               <a:t>Sistema de Backoffice</a:t>
             </a:r>
             <a:r>
-              <a:rPr lang="pt-BR" sz="2800" dirty="0"/>
+              <a:rPr lang="pt-BR" sz="2500" dirty="0"/>
               <a:t> </a:t>
             </a:r>
-            <a:r>
-              <a:rPr lang="pt-BR" sz="2800" dirty="0">
-                <a:latin typeface="Arial" panose="020B0604020202020204" pitchFamily="34" charset="0"/>
-                <a:cs typeface="Arial" panose="020B0604020202020204" pitchFamily="34" charset="0"/>
-              </a:rPr>
-              <a:t>– que cuida de processos administrativos, financeiros, contábeis e de recursos humanos.</a:t>
-            </a:r>
-          </a:p>
-          <a:p>
-            <a:endParaRPr lang="pt-BR" dirty="0"/>
+            <a:endParaRPr lang="pt-BR" sz="2500" dirty="0">
+              <a:latin typeface="Arial" panose="020B0604020202020204" pitchFamily="34" charset="0"/>
+              <a:cs typeface="Arial" panose="020B0604020202020204" pitchFamily="34" charset="0"/>
+            </a:endParaRPr>
+          </a:p>
+          <a:p>
+            <a:pPr lvl="1"/>
+            <a:endParaRPr lang="pt-BR" sz="2500" b="1" dirty="0"/>
+          </a:p>
+          <a:p>
+            <a:pPr marL="342900" lvl="1" indent="0">
+              <a:buNone/>
+            </a:pPr>
+            <a:r>
+              <a:rPr lang="pt-BR" sz="2500" b="1" dirty="0" err="1"/>
+              <a:t>Obs</a:t>
+            </a:r>
+            <a:r>
+              <a:rPr lang="pt-BR" sz="2500" b="1" dirty="0"/>
+              <a:t>: </a:t>
+            </a:r>
+            <a:r>
+              <a:rPr lang="pt-BR" sz="2500" dirty="0"/>
+              <a:t>É um dos recursos que permite a segurança de dados (LGPD)</a:t>
+            </a:r>
           </a:p>
         </p:txBody>
       </p:sp>
@@ -22240,13 +22131,7 @@
   <p:cSld>
     <p:spTree>
       <p:nvGrpSpPr>
-        <p:cNvPr id="1" name="Shape 106">
-          <a:extLst>
-            <a:ext uri="{FF2B5EF4-FFF2-40B4-BE49-F238E27FC236}">
-              <a16:creationId xmlns:a16="http://schemas.microsoft.com/office/drawing/2014/main" id="{AF51F769-01D0-9717-762D-CBD788E79ED8}"/>
-            </a:ext>
-          </a:extLst>
-        </p:cNvPr>
+        <p:cNvPr id="1" name="Shape 77"/>
         <p:cNvGrpSpPr/>
         <p:nvPr/>
       </p:nvGrpSpPr>
@@ -22258,76 +22143,215 @@
           <a:chExt cx="0" cy="0"/>
         </a:xfrm>
       </p:grpSpPr>
-      <p:sp>
-        <p:nvSpPr>
-          <p:cNvPr id="107" name="Google Shape;107;p21">
-            <a:extLst>
-              <a:ext uri="{FF2B5EF4-FFF2-40B4-BE49-F238E27FC236}">
-                <a16:creationId xmlns:a16="http://schemas.microsoft.com/office/drawing/2014/main" id="{22BE551E-CA93-DB77-5C86-1195EB8FB755}"/>
-              </a:ext>
-            </a:extLst>
-          </p:cNvPr>
-          <p:cNvSpPr txBox="1">
-            <a:spLocks noGrp="1"/>
-          </p:cNvSpPr>
-          <p:nvPr>
-            <p:ph type="title"/>
-          </p:nvPr>
-        </p:nvSpPr>
+      <p:pic>
+        <p:nvPicPr>
+          <p:cNvPr id="78" name="Google Shape;78;p17" title="Gráfico"/>
+          <p:cNvPicPr preferRelativeResize="0"/>
+          <p:nvPr/>
+        </p:nvPicPr>
+        <p:blipFill rotWithShape="1">
+          <a:blip r:embed="rId3">
+            <a:alphaModFix/>
+          </a:blip>
+          <a:srcRect b="3836"/>
+          <a:stretch/>
+        </p:blipFill>
         <p:spPr>
           <a:xfrm>
-            <a:off x="311700" y="1302275"/>
-            <a:ext cx="8520600" cy="572700"/>
+            <a:off x="93063" y="1418574"/>
+            <a:ext cx="6997861" cy="4582177"/>
           </a:xfrm>
           <a:prstGeom prst="rect">
             <a:avLst/>
           </a:prstGeom>
+          <a:noFill/>
+          <a:ln>
+            <a:noFill/>
+          </a:ln>
+        </p:spPr>
+      </p:pic>
+      <p:sp>
+        <p:nvSpPr>
+          <p:cNvPr id="79" name="Google Shape;79;p17"/>
+          <p:cNvSpPr txBox="1"/>
+          <p:nvPr/>
+        </p:nvSpPr>
+        <p:spPr>
+          <a:xfrm>
+            <a:off x="855600" y="952075"/>
+            <a:ext cx="7574700" cy="610500"/>
+          </a:xfrm>
+          <a:prstGeom prst="rect">
+            <a:avLst/>
+          </a:prstGeom>
+          <a:noFill/>
+          <a:ln>
+            <a:noFill/>
+          </a:ln>
         </p:spPr>
         <p:txBody>
-          <a:bodyPr spcFirstLastPara="1" vert="horz" wrap="square" lIns="91425" tIns="91425" rIns="91425" bIns="91425" rtlCol="0" anchor="t" anchorCtr="0">
-            <a:normAutofit fontScale="90000"/>
+          <a:bodyPr spcFirstLastPara="1" wrap="square" lIns="91425" tIns="91425" rIns="91425" bIns="91425" anchor="t" anchorCtr="0">
+            <a:noAutofit/>
           </a:bodyPr>
           <a:lstStyle/>
           <a:p>
-            <a:r>
-              <a:rPr lang="pt-BR"/>
-              <a:t>Atualizações</a:t>
-            </a:r>
-            <a:endParaRPr/>
+            <a:pPr algn="ctr">
+              <a:buClr>
+                <a:srgbClr val="000000"/>
+              </a:buClr>
+              <a:buSzPts val="2000"/>
+            </a:pPr>
+            <a:r>
+              <a:rPr lang="pt-BR" sz="3000" dirty="0" err="1">
+                <a:solidFill>
+                  <a:srgbClr val="47BF38"/>
+                </a:solidFill>
+                <a:latin typeface="Raleway Light"/>
+                <a:ea typeface="Raleway Light"/>
+                <a:cs typeface="Raleway Light"/>
+                <a:sym typeface="Raleway Light"/>
+              </a:rPr>
+              <a:t>AGHUse</a:t>
+            </a:r>
+            <a:r>
+              <a:rPr lang="pt-BR" sz="3000" dirty="0">
+                <a:solidFill>
+                  <a:srgbClr val="47BF38"/>
+                </a:solidFill>
+                <a:latin typeface="Raleway Light"/>
+                <a:ea typeface="Raleway Light"/>
+                <a:cs typeface="Raleway Light"/>
+                <a:sym typeface="Raleway Light"/>
+              </a:rPr>
+              <a:t> - </a:t>
+            </a:r>
+            <a:r>
+              <a:rPr lang="pt-BR" sz="2000" dirty="0">
+                <a:solidFill>
+                  <a:srgbClr val="47BF38"/>
+                </a:solidFill>
+                <a:latin typeface="Raleway Light"/>
+                <a:ea typeface="Raleway Light"/>
+                <a:cs typeface="Raleway Light"/>
+                <a:sym typeface="Raleway Light"/>
+              </a:rPr>
+              <a:t>Evolução em </a:t>
+            </a:r>
+            <a:r>
+              <a:rPr lang="pt-BR" sz="2000" dirty="0" err="1">
+                <a:solidFill>
+                  <a:srgbClr val="47BF38"/>
+                </a:solidFill>
+                <a:latin typeface="Raleway Light"/>
+                <a:ea typeface="Raleway Light"/>
+                <a:cs typeface="Raleway Light"/>
+                <a:sym typeface="Raleway Light"/>
+              </a:rPr>
+              <a:t>Macropontos</a:t>
+            </a:r>
+            <a:endParaRPr sz="2000" b="1" dirty="0">
+              <a:solidFill>
+                <a:srgbClr val="47BF38"/>
+              </a:solidFill>
+              <a:latin typeface="Raleway"/>
+              <a:ea typeface="Raleway"/>
+              <a:cs typeface="Raleway"/>
+              <a:sym typeface="Raleway"/>
+            </a:endParaRPr>
           </a:p>
         </p:txBody>
       </p:sp>
       <p:sp>
         <p:nvSpPr>
-          <p:cNvPr id="3" name="Espaço Reservado para Texto 2">
+          <p:cNvPr id="2" name="CaixaDeTexto 1">
             <a:extLst>
               <a:ext uri="{FF2B5EF4-FFF2-40B4-BE49-F238E27FC236}">
-                <a16:creationId xmlns:a16="http://schemas.microsoft.com/office/drawing/2014/main" id="{C011B86D-2059-BC90-1640-68288688A082}"/>
+                <a16:creationId xmlns:a16="http://schemas.microsoft.com/office/drawing/2014/main" id="{8B17D4DC-2696-04B4-79E9-1430721FCB81}"/>
               </a:ext>
             </a:extLst>
           </p:cNvPr>
-          <p:cNvSpPr>
-            <a:spLocks noGrp="1"/>
-          </p:cNvSpPr>
-          <p:nvPr>
-            <p:ph type="body" idx="1"/>
-          </p:nvPr>
+          <p:cNvSpPr txBox="1"/>
+          <p:nvPr/>
         </p:nvSpPr>
-        <p:spPr/>
+        <p:spPr>
+          <a:xfrm>
+            <a:off x="7009213" y="4881129"/>
+            <a:ext cx="1960015" cy="1723549"/>
+          </a:xfrm>
+          <a:prstGeom prst="rect">
+            <a:avLst/>
+          </a:prstGeom>
+          <a:solidFill>
+            <a:schemeClr val="accent2">
+              <a:lumMod val="20000"/>
+              <a:lumOff val="80000"/>
+            </a:schemeClr>
+          </a:solidFill>
+        </p:spPr>
         <p:txBody>
-          <a:bodyPr/>
+          <a:bodyPr wrap="square" rtlCol="0">
+            <a:spAutoFit/>
+          </a:bodyPr>
           <a:lstStyle/>
           <a:p>
-            <a:endParaRPr lang="pt-BR"/>
+            <a:r>
+              <a:rPr lang="pt-BR" sz="1100" dirty="0"/>
+              <a:t>1 </a:t>
+            </a:r>
+            <a:r>
+              <a:rPr lang="pt-BR" sz="1100" dirty="0" err="1"/>
+              <a:t>macroponto</a:t>
+            </a:r>
+            <a:r>
+              <a:rPr lang="pt-BR" sz="1100" dirty="0"/>
+              <a:t>= </a:t>
+            </a:r>
+          </a:p>
+          <a:p>
+            <a:r>
+              <a:rPr lang="pt-BR" sz="1100" dirty="0"/>
+              <a:t>+/- </a:t>
+            </a:r>
+          </a:p>
+          <a:p>
+            <a:r>
+              <a:rPr lang="pt-BR" sz="1100" dirty="0"/>
+              <a:t>U$ 200.000,00</a:t>
+            </a:r>
+          </a:p>
+          <a:p>
+            <a:endParaRPr lang="pt-BR" sz="1100" dirty="0"/>
+          </a:p>
+          <a:p>
+            <a:r>
+              <a:rPr lang="pt-BR" sz="1100" dirty="0"/>
+              <a:t>+/-</a:t>
+            </a:r>
+          </a:p>
+          <a:p>
+            <a:r>
+              <a:rPr lang="pt-BR" sz="1100" dirty="0"/>
+              <a:t>R$ </a:t>
+            </a:r>
+          </a:p>
+          <a:p>
+            <a:r>
+              <a:rPr lang="pt-BR" sz="1100" dirty="0"/>
+              <a:t>12.899.250.000,00</a:t>
+            </a:r>
+          </a:p>
+          <a:p>
+            <a:r>
+              <a:rPr lang="pt-BR" sz="1100" dirty="0"/>
+              <a:t>Estimativa pelo Radamés</a:t>
+            </a:r>
+          </a:p>
+          <a:p>
+            <a:endParaRPr lang="pt-BR" dirty="0"/>
           </a:p>
         </p:txBody>
       </p:sp>
     </p:spTree>
-    <p:extLst>
-      <p:ext uri="{BB962C8B-B14F-4D97-AF65-F5344CB8AC3E}">
-        <p14:creationId xmlns:p14="http://schemas.microsoft.com/office/powerpoint/2010/main" val="3765535251"/>
-      </p:ext>
-    </p:extLst>
   </p:cSld>
   <p:clrMapOvr>
     <a:masterClrMapping/>
@@ -22610,239 +22634,6 @@
 </file>
 
 <file path=ppt/slides/slide50.xml><?xml version="1.0" encoding="utf-8"?>
-<p:sld xmlns:a="http://schemas.openxmlformats.org/drawingml/2006/main" xmlns:r="http://schemas.openxmlformats.org/officeDocument/2006/relationships" xmlns:p="http://schemas.openxmlformats.org/presentationml/2006/main">
-  <p:cSld>
-    <p:spTree>
-      <p:nvGrpSpPr>
-        <p:cNvPr id="1" name="Shape 77"/>
-        <p:cNvGrpSpPr/>
-        <p:nvPr/>
-      </p:nvGrpSpPr>
-      <p:grpSpPr>
-        <a:xfrm>
-          <a:off x="0" y="0"/>
-          <a:ext cx="0" cy="0"/>
-          <a:chOff x="0" y="0"/>
-          <a:chExt cx="0" cy="0"/>
-        </a:xfrm>
-      </p:grpSpPr>
-      <p:pic>
-        <p:nvPicPr>
-          <p:cNvPr id="78" name="Google Shape;78;p17" title="Gráfico"/>
-          <p:cNvPicPr preferRelativeResize="0"/>
-          <p:nvPr/>
-        </p:nvPicPr>
-        <p:blipFill rotWithShape="1">
-          <a:blip r:embed="rId3">
-            <a:alphaModFix/>
-          </a:blip>
-          <a:srcRect b="3836"/>
-          <a:stretch/>
-        </p:blipFill>
-        <p:spPr>
-          <a:xfrm>
-            <a:off x="93063" y="1418574"/>
-            <a:ext cx="6997861" cy="4582177"/>
-          </a:xfrm>
-          <a:prstGeom prst="rect">
-            <a:avLst/>
-          </a:prstGeom>
-          <a:noFill/>
-          <a:ln>
-            <a:noFill/>
-          </a:ln>
-        </p:spPr>
-      </p:pic>
-      <p:sp>
-        <p:nvSpPr>
-          <p:cNvPr id="79" name="Google Shape;79;p17"/>
-          <p:cNvSpPr txBox="1"/>
-          <p:nvPr/>
-        </p:nvSpPr>
-        <p:spPr>
-          <a:xfrm>
-            <a:off x="855600" y="952075"/>
-            <a:ext cx="7574700" cy="610500"/>
-          </a:xfrm>
-          <a:prstGeom prst="rect">
-            <a:avLst/>
-          </a:prstGeom>
-          <a:noFill/>
-          <a:ln>
-            <a:noFill/>
-          </a:ln>
-        </p:spPr>
-        <p:txBody>
-          <a:bodyPr spcFirstLastPara="1" wrap="square" lIns="91425" tIns="91425" rIns="91425" bIns="91425" anchor="t" anchorCtr="0">
-            <a:noAutofit/>
-          </a:bodyPr>
-          <a:lstStyle/>
-          <a:p>
-            <a:pPr algn="ctr">
-              <a:buClr>
-                <a:srgbClr val="000000"/>
-              </a:buClr>
-              <a:buSzPts val="2000"/>
-            </a:pPr>
-            <a:r>
-              <a:rPr lang="pt-BR" sz="3000" dirty="0" err="1">
-                <a:solidFill>
-                  <a:srgbClr val="47BF38"/>
-                </a:solidFill>
-                <a:latin typeface="Raleway Light"/>
-                <a:ea typeface="Raleway Light"/>
-                <a:cs typeface="Raleway Light"/>
-                <a:sym typeface="Raleway Light"/>
-              </a:rPr>
-              <a:t>AGHUse</a:t>
-            </a:r>
-            <a:r>
-              <a:rPr lang="pt-BR" sz="3000" dirty="0">
-                <a:solidFill>
-                  <a:srgbClr val="47BF38"/>
-                </a:solidFill>
-                <a:latin typeface="Raleway Light"/>
-                <a:ea typeface="Raleway Light"/>
-                <a:cs typeface="Raleway Light"/>
-                <a:sym typeface="Raleway Light"/>
-              </a:rPr>
-              <a:t> - </a:t>
-            </a:r>
-            <a:r>
-              <a:rPr lang="pt-BR" sz="2000" dirty="0">
-                <a:solidFill>
-                  <a:srgbClr val="47BF38"/>
-                </a:solidFill>
-                <a:latin typeface="Raleway Light"/>
-                <a:ea typeface="Raleway Light"/>
-                <a:cs typeface="Raleway Light"/>
-                <a:sym typeface="Raleway Light"/>
-              </a:rPr>
-              <a:t>Evolução em </a:t>
-            </a:r>
-            <a:r>
-              <a:rPr lang="pt-BR" sz="2000" dirty="0" err="1">
-                <a:solidFill>
-                  <a:srgbClr val="47BF38"/>
-                </a:solidFill>
-                <a:latin typeface="Raleway Light"/>
-                <a:ea typeface="Raleway Light"/>
-                <a:cs typeface="Raleway Light"/>
-                <a:sym typeface="Raleway Light"/>
-              </a:rPr>
-              <a:t>Macropontos</a:t>
-            </a:r>
-            <a:endParaRPr sz="2000" b="1" dirty="0">
-              <a:solidFill>
-                <a:srgbClr val="47BF38"/>
-              </a:solidFill>
-              <a:latin typeface="Raleway"/>
-              <a:ea typeface="Raleway"/>
-              <a:cs typeface="Raleway"/>
-              <a:sym typeface="Raleway"/>
-            </a:endParaRPr>
-          </a:p>
-        </p:txBody>
-      </p:sp>
-      <p:sp>
-        <p:nvSpPr>
-          <p:cNvPr id="2" name="CaixaDeTexto 1">
-            <a:extLst>
-              <a:ext uri="{FF2B5EF4-FFF2-40B4-BE49-F238E27FC236}">
-                <a16:creationId xmlns:a16="http://schemas.microsoft.com/office/drawing/2014/main" id="{8B17D4DC-2696-04B4-79E9-1430721FCB81}"/>
-              </a:ext>
-            </a:extLst>
-          </p:cNvPr>
-          <p:cNvSpPr txBox="1"/>
-          <p:nvPr/>
-        </p:nvSpPr>
-        <p:spPr>
-          <a:xfrm>
-            <a:off x="7009213" y="4881129"/>
-            <a:ext cx="1960015" cy="1723549"/>
-          </a:xfrm>
-          <a:prstGeom prst="rect">
-            <a:avLst/>
-          </a:prstGeom>
-          <a:solidFill>
-            <a:schemeClr val="accent2">
-              <a:lumMod val="20000"/>
-              <a:lumOff val="80000"/>
-            </a:schemeClr>
-          </a:solidFill>
-        </p:spPr>
-        <p:txBody>
-          <a:bodyPr wrap="square" rtlCol="0">
-            <a:spAutoFit/>
-          </a:bodyPr>
-          <a:lstStyle/>
-          <a:p>
-            <a:r>
-              <a:rPr lang="pt-BR" sz="1100" dirty="0"/>
-              <a:t>1 </a:t>
-            </a:r>
-            <a:r>
-              <a:rPr lang="pt-BR" sz="1100" dirty="0" err="1"/>
-              <a:t>macroponto</a:t>
-            </a:r>
-            <a:r>
-              <a:rPr lang="pt-BR" sz="1100" dirty="0"/>
-              <a:t>= </a:t>
-            </a:r>
-          </a:p>
-          <a:p>
-            <a:r>
-              <a:rPr lang="pt-BR" sz="1100" dirty="0"/>
-              <a:t>+/- </a:t>
-            </a:r>
-          </a:p>
-          <a:p>
-            <a:r>
-              <a:rPr lang="pt-BR" sz="1100" dirty="0"/>
-              <a:t>U$ 200.000,00</a:t>
-            </a:r>
-          </a:p>
-          <a:p>
-            <a:endParaRPr lang="pt-BR" sz="1100" dirty="0"/>
-          </a:p>
-          <a:p>
-            <a:r>
-              <a:rPr lang="pt-BR" sz="1100" dirty="0"/>
-              <a:t>+/-</a:t>
-            </a:r>
-          </a:p>
-          <a:p>
-            <a:r>
-              <a:rPr lang="pt-BR" sz="1100" dirty="0"/>
-              <a:t>R$ </a:t>
-            </a:r>
-          </a:p>
-          <a:p>
-            <a:r>
-              <a:rPr lang="pt-BR" sz="1100" dirty="0"/>
-              <a:t>12.899.250.000,00</a:t>
-            </a:r>
-          </a:p>
-          <a:p>
-            <a:r>
-              <a:rPr lang="pt-BR" sz="1100" dirty="0"/>
-              <a:t>Estimativa pelo Radamés</a:t>
-            </a:r>
-          </a:p>
-          <a:p>
-            <a:endParaRPr lang="pt-BR" dirty="0"/>
-          </a:p>
-        </p:txBody>
-      </p:sp>
-    </p:spTree>
-  </p:cSld>
-  <p:clrMapOvr>
-    <a:masterClrMapping/>
-  </p:clrMapOvr>
-</p:sld>
-</file>
-
-<file path=ppt/slides/slide51.xml><?xml version="1.0" encoding="utf-8"?>
 <p:sld xmlns:a="http://schemas.openxmlformats.org/drawingml/2006/main" xmlns:r="http://schemas.openxmlformats.org/officeDocument/2006/relationships" xmlns:p="http://schemas.openxmlformats.org/presentationml/2006/main">
   <p:cSld>
     <p:bg>

</xml_diff>